<commit_message>
Presentaion for group uploaded as requested
</commit_message>
<xml_diff>
--- a/Global_portfolio_analysis.pptx
+++ b/Global_portfolio_analysis.pptx
@@ -7685,7 +7685,7 @@
         </p:spPr>
         <p:txBody>
           <a:bodyPr>
-            <a:normAutofit lnSpcReduction="10000"/>
+            <a:normAutofit fontScale="85000" lnSpcReduction="20000"/>
           </a:bodyPr>
           <a:lstStyle/>
           <a:p>
@@ -7817,13 +7817,25 @@
               </a:rPr>
               <a:t> net debt to EBITDA  </a:t>
             </a:r>
-            <a:endParaRPr lang="en-US" sz="2400" b="1" dirty="0">
-              <a:solidFill>
+          </a:p>
+          <a:p>
+            <a:pPr lvl="2" algn="just">
+              <a:buClr>
                 <a:schemeClr val="bg1"/>
-              </a:solidFill>
-              <a:latin typeface="Slack-Lato"/>
-              <a:cs typeface="Calibri" panose="020F0502020204030204" pitchFamily="34" charset="0"/>
-            </a:endParaRPr>
+              </a:buClr>
+              <a:buFont typeface="Wingdings" panose="05000000000000000000" pitchFamily="2" charset="2"/>
+              <a:buChar char="Ø"/>
+            </a:pPr>
+            <a:r>
+              <a:rPr lang="en-US" sz="2400" b="1" dirty="0">
+                <a:solidFill>
+                  <a:schemeClr val="bg1"/>
+                </a:solidFill>
+                <a:latin typeface="Slack-Lato"/>
+                <a:cs typeface="Calibri" panose="020F0502020204030204" pitchFamily="34" charset="0"/>
+              </a:rPr>
+              <a:t>P/E and Beta information</a:t>
+            </a:r>
           </a:p>
           <a:p>
             <a:pPr marL="0" indent="0" algn="just">
@@ -7875,7 +7887,74 @@
                 <a:latin typeface="Slack-Lato"/>
                 <a:cs typeface="Calibri" panose="020F0502020204030204" pitchFamily="34" charset="0"/>
               </a:rPr>
-              <a:t>After calculating for all companies, we selected the top performing</a:t>
+              <a:t>After calculating for all companies, we selected the top performing stocks</a:t>
+            </a:r>
+          </a:p>
+          <a:p>
+            <a:pPr algn="just">
+              <a:buClr>
+                <a:schemeClr val="bg1"/>
+              </a:buClr>
+              <a:buFont typeface="Wingdings" panose="05000000000000000000" pitchFamily="2" charset="2"/>
+              <a:buChar char="§"/>
+            </a:pPr>
+            <a:r>
+              <a:rPr lang="en-US" sz="2200" b="1" dirty="0">
+                <a:solidFill>
+                  <a:schemeClr val="bg1"/>
+                </a:solidFill>
+                <a:latin typeface="Slack-Lato"/>
+                <a:cs typeface="Calibri" panose="020F0502020204030204" pitchFamily="34" charset="0"/>
+              </a:rPr>
+              <a:t>Risk based allocation of crypto and treasury</a:t>
+            </a:r>
+          </a:p>
+          <a:p>
+            <a:pPr algn="just">
+              <a:buClr>
+                <a:schemeClr val="bg1"/>
+              </a:buClr>
+              <a:buFont typeface="Wingdings" panose="05000000000000000000" pitchFamily="2" charset="2"/>
+              <a:buChar char="§"/>
+            </a:pPr>
+            <a:r>
+              <a:rPr lang="en-US" sz="2200" b="1" dirty="0">
+                <a:solidFill>
+                  <a:schemeClr val="bg1"/>
+                </a:solidFill>
+                <a:latin typeface="Slack-Lato"/>
+                <a:cs typeface="Calibri" panose="020F0502020204030204" pitchFamily="34" charset="0"/>
+              </a:rPr>
+              <a:t>Portfolio real time risk free interest used. </a:t>
+            </a:r>
+          </a:p>
+          <a:p>
+            <a:pPr algn="just">
+              <a:buClr>
+                <a:schemeClr val="bg1"/>
+              </a:buClr>
+              <a:buFont typeface="Wingdings" panose="05000000000000000000" pitchFamily="2" charset="2"/>
+              <a:buChar char="§"/>
+            </a:pPr>
+            <a:r>
+              <a:rPr lang="en-US" sz="2200" b="1" dirty="0">
+                <a:solidFill>
+                  <a:schemeClr val="bg1"/>
+                </a:solidFill>
+                <a:latin typeface="Slack-Lato"/>
+                <a:cs typeface="Calibri" panose="020F0502020204030204" pitchFamily="34" charset="0"/>
+              </a:rPr>
+              <a:t>Detailed analysis of portfolio </a:t>
+            </a:r>
+            <a:r>
+              <a:rPr lang="en-US" sz="2200" b="1">
+                <a:solidFill>
+                  <a:schemeClr val="bg1"/>
+                </a:solidFill>
+                <a:latin typeface="Slack-Lato"/>
+                <a:cs typeface="Calibri" panose="020F0502020204030204" pitchFamily="34" charset="0"/>
+              </a:rPr>
+              <a:t>and instruments</a:t>
             </a:r>
             <a:endParaRPr lang="en-AU" sz="2200" b="1" dirty="0">
               <a:solidFill>
@@ -9641,15 +9720,6 @@
 </file>
 
 <file path=customXml/item2.xml><?xml version="1.0" encoding="utf-8"?>
-<p:properties xmlns:p="http://schemas.microsoft.com/office/2006/metadata/properties" xmlns:xsi="http://www.w3.org/2001/XMLSchema-instance" xmlns:pc="http://schemas.microsoft.com/office/infopath/2007/PartnerControls">
-  <documentManagement>
-    <Status xmlns="71af3243-3dd4-4a8d-8c0d-dd76da1f02a5">Not started</Status>
-    <MediaServiceKeyPoints xmlns="71af3243-3dd4-4a8d-8c0d-dd76da1f02a5" xsi:nil="true"/>
-  </documentManagement>
-</p:properties>
-</file>
-
-<file path=customXml/item3.xml><?xml version="1.0" encoding="utf-8"?>
 <ct:contentTypeSchema xmlns:ct="http://schemas.microsoft.com/office/2006/metadata/contentType" xmlns:ma="http://schemas.microsoft.com/office/2006/metadata/properties/metaAttributes" ct:_="" ma:_="" ma:contentTypeName="Document" ma:contentTypeID="0x01010079F111ED35F8CC479449609E8A0923A6" ma:contentTypeVersion="12" ma:contentTypeDescription="Create a new document." ma:contentTypeScope="" ma:versionID="93813dd7ca6ad654711aa0ab317e03a3">
   <xsd:schema xmlns:xsd="http://www.w3.org/2001/XMLSchema" xmlns:xs="http://www.w3.org/2001/XMLSchema" xmlns:p="http://schemas.microsoft.com/office/2006/metadata/properties" xmlns:ns2="71af3243-3dd4-4a8d-8c0d-dd76da1f02a5" xmlns:ns3="16c05727-aa75-4e4a-9b5f-8a80a1165891" targetNamespace="http://schemas.microsoft.com/office/2006/metadata/properties" ma:root="true" ma:fieldsID="f11dc0ce689dd3925e84e4e35398c6e7" ns2:_="" ns3:_="">
     <xsd:import namespace="71af3243-3dd4-4a8d-8c0d-dd76da1f02a5"/>
@@ -9870,6 +9940,15 @@
 </ct:contentTypeSchema>
 </file>
 
+<file path=customXml/item3.xml><?xml version="1.0" encoding="utf-8"?>
+<p:properties xmlns:p="http://schemas.microsoft.com/office/2006/metadata/properties" xmlns:xsi="http://www.w3.org/2001/XMLSchema-instance" xmlns:pc="http://schemas.microsoft.com/office/infopath/2007/PartnerControls">
+  <documentManagement>
+    <Status xmlns="71af3243-3dd4-4a8d-8c0d-dd76da1f02a5">Not started</Status>
+    <MediaServiceKeyPoints xmlns="71af3243-3dd4-4a8d-8c0d-dd76da1f02a5" xsi:nil="true"/>
+  </documentManagement>
+</p:properties>
+</file>
+
 <file path=customXml/itemProps1.xml><?xml version="1.0" encoding="utf-8"?>
 <ds:datastoreItem xmlns:ds="http://schemas.openxmlformats.org/officeDocument/2006/customXml" ds:itemID="{C28223DC-4748-4F7F-8D8D-E4EA5A6C1882}">
   <ds:schemaRefs>
@@ -9879,16 +9958,6 @@
 </file>
 
 <file path=customXml/itemProps2.xml><?xml version="1.0" encoding="utf-8"?>
-<ds:datastoreItem xmlns:ds="http://schemas.openxmlformats.org/officeDocument/2006/customXml" ds:itemID="{1F4D5ADA-BB6C-46F4-9A97-3A3D44A9A8A6}">
-  <ds:schemaRefs>
-    <ds:schemaRef ds:uri="http://schemas.microsoft.com/office/2006/metadata/properties"/>
-    <ds:schemaRef ds:uri="http://schemas.microsoft.com/office/infopath/2007/PartnerControls"/>
-    <ds:schemaRef ds:uri="71af3243-3dd4-4a8d-8c0d-dd76da1f02a5"/>
-  </ds:schemaRefs>
-</ds:datastoreItem>
-</file>
-
-<file path=customXml/itemProps3.xml><?xml version="1.0" encoding="utf-8"?>
 <ds:datastoreItem xmlns:ds="http://schemas.openxmlformats.org/officeDocument/2006/customXml" ds:itemID="{1612D154-BCA4-47A9-881C-4EFB9658D8AB}">
   <ds:schemaRefs>
     <ds:schemaRef ds:uri="http://schemas.microsoft.com/office/2006/metadata/contentType"/>
@@ -9905,4 +9974,14 @@
     <ds:schemaRef ds:uri="http://schemas.microsoft.com/internal/obd"/>
   </ds:schemaRefs>
 </ds:datastoreItem>
+</file>
+
+<file path=customXml/itemProps3.xml><?xml version="1.0" encoding="utf-8"?>
+<ds:datastoreItem xmlns:ds="http://schemas.openxmlformats.org/officeDocument/2006/customXml" ds:itemID="{1F4D5ADA-BB6C-46F4-9A97-3A3D44A9A8A6}">
+  <ds:schemaRefs>
+    <ds:schemaRef ds:uri="http://schemas.microsoft.com/office/2006/metadata/properties"/>
+    <ds:schemaRef ds:uri="http://schemas.microsoft.com/office/infopath/2007/PartnerControls"/>
+    <ds:schemaRef ds:uri="71af3243-3dd4-4a8d-8c0d-dd76da1f02a5"/>
+  </ds:schemaRefs>
+</ds:datastoreItem>
 </file>
</xml_diff>